<commit_message>
Changed distance title slide 21
</commit_message>
<xml_diff>
--- a/Spotiflop_ML.pptx
+++ b/Spotiflop_ML.pptx
@@ -8047,7 +8047,7 @@
         <p:spPr>
           <a:xfrm>
             <a:off x="1040202" y="579918"/>
-            <a:ext cx="4446197" cy="1325563"/>
+            <a:ext cx="4726116" cy="1325563"/>
           </a:xfrm>
           <a:prstGeom prst="rect">
             <a:avLst/>
@@ -8079,7 +8079,7 @@
                 <a:ea typeface="+mj-ea"/>
                 <a:cs typeface="+mj-cs"/>
               </a:rPr>
-              <a:t>Euclidean Distance</a:t>
+              <a:t>MANHATTAN Distance</a:t>
             </a:r>
           </a:p>
         </p:txBody>
@@ -10456,13 +10456,13 @@
   <p:clrMapOvr>
     <a:masterClrMapping/>
   </p:clrMapOvr>
-  <mc:AlternateContent xmlns:mc="http://schemas.openxmlformats.org/markup-compatibility/2006">
-    <mc:Choice xmlns:p14="http://schemas.microsoft.com/office/powerpoint/2010/main" Requires="p14">
+  <mc:AlternateContent xmlns:mc="http://schemas.openxmlformats.org/markup-compatibility/2006" xmlns:p14="http://schemas.microsoft.com/office/powerpoint/2010/main">
+    <mc:Choice Requires="p14">
       <p:transition spd="med" p14:dur="700">
         <p:fade/>
       </p:transition>
     </mc:Choice>
-    <mc:Fallback>
+    <mc:Fallback xmlns="">
       <p:transition spd="med">
         <p:fade/>
       </p:transition>
@@ -13473,13 +13473,13 @@
   <p:clrMapOvr>
     <a:masterClrMapping/>
   </p:clrMapOvr>
-  <mc:AlternateContent xmlns:mc="http://schemas.openxmlformats.org/markup-compatibility/2006">
-    <mc:Choice xmlns:p14="http://schemas.microsoft.com/office/powerpoint/2010/main" Requires="p14">
+  <mc:AlternateContent xmlns:mc="http://schemas.openxmlformats.org/markup-compatibility/2006" xmlns:p14="http://schemas.microsoft.com/office/powerpoint/2010/main">
+    <mc:Choice Requires="p14">
       <p:transition spd="slow">
         <p14:reveal/>
       </p:transition>
     </mc:Choice>
-    <mc:Fallback>
+    <mc:Fallback xmlns="">
       <p:transition spd="slow">
         <p:fade/>
       </p:transition>
@@ -13613,13 +13613,13 @@
   <p:clrMapOvr>
     <a:masterClrMapping/>
   </p:clrMapOvr>
-  <mc:AlternateContent xmlns:mc="http://schemas.openxmlformats.org/markup-compatibility/2006">
-    <mc:Choice xmlns:p159="http://schemas.microsoft.com/office/powerpoint/2015/09/main" Requires="p159">
+  <mc:AlternateContent xmlns:mc="http://schemas.openxmlformats.org/markup-compatibility/2006" xmlns:p159="http://schemas.microsoft.com/office/powerpoint/2015/09/main">
+    <mc:Choice Requires="p159">
       <p:transition spd="slow">
         <p159:morph option="byObject"/>
       </p:transition>
     </mc:Choice>
-    <mc:Fallback>
+    <mc:Fallback xmlns="">
       <p:transition spd="slow">
         <p:fade/>
       </p:transition>
@@ -13750,13 +13750,13 @@
   <p:clrMapOvr>
     <a:masterClrMapping/>
   </p:clrMapOvr>
-  <mc:AlternateContent xmlns:mc="http://schemas.openxmlformats.org/markup-compatibility/2006">
-    <mc:Choice xmlns:p159="http://schemas.microsoft.com/office/powerpoint/2015/09/main" Requires="p159">
+  <mc:AlternateContent xmlns:mc="http://schemas.openxmlformats.org/markup-compatibility/2006" xmlns:p159="http://schemas.microsoft.com/office/powerpoint/2015/09/main">
+    <mc:Choice Requires="p159">
       <p:transition spd="slow">
         <p159:morph option="byObject"/>
       </p:transition>
     </mc:Choice>
-    <mc:Fallback>
+    <mc:Fallback xmlns="">
       <p:transition spd="slow">
         <p:fade/>
       </p:transition>
@@ -13885,13 +13885,13 @@
   <p:clrMapOvr>
     <a:masterClrMapping/>
   </p:clrMapOvr>
-  <mc:AlternateContent xmlns:mc="http://schemas.openxmlformats.org/markup-compatibility/2006">
-    <mc:Choice xmlns:p159="http://schemas.microsoft.com/office/powerpoint/2015/09/main" Requires="p159">
+  <mc:AlternateContent xmlns:mc="http://schemas.openxmlformats.org/markup-compatibility/2006" xmlns:p159="http://schemas.microsoft.com/office/powerpoint/2015/09/main">
+    <mc:Choice Requires="p159">
       <p:transition spd="slow">
         <p159:morph option="byObject"/>
       </p:transition>
     </mc:Choice>
-    <mc:Fallback>
+    <mc:Fallback xmlns="">
       <p:transition spd="slow">
         <p:fade/>
       </p:transition>
@@ -14022,13 +14022,13 @@
   <p:clrMapOvr>
     <a:masterClrMapping/>
   </p:clrMapOvr>
-  <mc:AlternateContent xmlns:mc="http://schemas.openxmlformats.org/markup-compatibility/2006">
-    <mc:Choice xmlns:p159="http://schemas.microsoft.com/office/powerpoint/2015/09/main" Requires="p159">
+  <mc:AlternateContent xmlns:mc="http://schemas.openxmlformats.org/markup-compatibility/2006" xmlns:p159="http://schemas.microsoft.com/office/powerpoint/2015/09/main">
+    <mc:Choice Requires="p159">
       <p:transition spd="slow">
         <p159:morph option="byObject"/>
       </p:transition>
     </mc:Choice>
-    <mc:Fallback>
+    <mc:Fallback xmlns="">
       <p:transition spd="slow">
         <p:fade/>
       </p:transition>
@@ -16803,6 +16803,26 @@
 </file>
 
 <file path=customXml/item2.xml><?xml version="1.0" encoding="utf-8"?>
+<p:properties xmlns:p="http://schemas.microsoft.com/office/2006/metadata/properties" xmlns:xsi="http://www.w3.org/2001/XMLSchema-instance" xmlns:pc="http://schemas.microsoft.com/office/infopath/2007/PartnerControls">
+  <documentManagement>
+    <_ip_UnifiedCompliancePolicyUIAction xmlns="http://schemas.microsoft.com/sharepoint/v3" xsi:nil="true"/>
+    <Image xmlns="71af3243-3dd4-4a8d-8c0d-dd76da1f02a5">
+      <Url xsi:nil="true"/>
+      <Description xsi:nil="true"/>
+    </Image>
+    <Status xmlns="71af3243-3dd4-4a8d-8c0d-dd76da1f02a5">Not started</Status>
+    <Background xmlns="71af3243-3dd4-4a8d-8c0d-dd76da1f02a5">false</Background>
+    <_ip_UnifiedCompliancePolicyProperties xmlns="http://schemas.microsoft.com/sharepoint/v3" xsi:nil="true"/>
+    <ImageTagsTaxHTField xmlns="71af3243-3dd4-4a8d-8c0d-dd76da1f02a5">
+      <Terms xmlns="http://schemas.microsoft.com/office/infopath/2007/PartnerControls"/>
+    </ImageTagsTaxHTField>
+    <TaxCatchAll xmlns="230e9df3-be65-4c73-a93b-d1236ebd677e" xsi:nil="true"/>
+    <MediaServiceKeyPoints xmlns="71af3243-3dd4-4a8d-8c0d-dd76da1f02a5" xsi:nil="true"/>
+  </documentManagement>
+</p:properties>
+</file>
+
+<file path=customXml/item3.xml><?xml version="1.0" encoding="utf-8"?>
 <ct:contentTypeSchema xmlns:ct="http://schemas.microsoft.com/office/2006/metadata/contentType" xmlns:ma="http://schemas.microsoft.com/office/2006/metadata/properties/metaAttributes" ct:_="" ma:_="" ma:contentTypeName="Document" ma:contentTypeID="0x01010079F111ED35F8CC479449609E8A0923A6" ma:contentTypeVersion="28" ma:contentTypeDescription="Create a new document." ma:contentTypeScope="" ma:versionID="60f5a4f2d2b0abadcf532d48ebf9cb71">
   <xsd:schema xmlns:xsd="http://www.w3.org/2001/XMLSchema" xmlns:xs="http://www.w3.org/2001/XMLSchema" xmlns:p="http://schemas.microsoft.com/office/2006/metadata/properties" xmlns:ns1="http://schemas.microsoft.com/sharepoint/v3" xmlns:ns2="71af3243-3dd4-4a8d-8c0d-dd76da1f02a5" xmlns:ns3="16c05727-aa75-4e4a-9b5f-8a80a1165891" xmlns:ns4="230e9df3-be65-4c73-a93b-d1236ebd677e" targetNamespace="http://schemas.microsoft.com/office/2006/metadata/properties" ma:root="true" ma:fieldsID="7dd78129e6a1811f84807ad11c651531" ns1:_="" ns2:_="" ns3:_="" ns4:_="">
     <xsd:import namespace="http://schemas.microsoft.com/sharepoint/v3"/>
@@ -17114,26 +17134,6 @@
 </ct:contentTypeSchema>
 </file>
 
-<file path=customXml/item3.xml><?xml version="1.0" encoding="utf-8"?>
-<p:properties xmlns:p="http://schemas.microsoft.com/office/2006/metadata/properties" xmlns:xsi="http://www.w3.org/2001/XMLSchema-instance" xmlns:pc="http://schemas.microsoft.com/office/infopath/2007/PartnerControls">
-  <documentManagement>
-    <_ip_UnifiedCompliancePolicyUIAction xmlns="http://schemas.microsoft.com/sharepoint/v3" xsi:nil="true"/>
-    <Image xmlns="71af3243-3dd4-4a8d-8c0d-dd76da1f02a5">
-      <Url xsi:nil="true"/>
-      <Description xsi:nil="true"/>
-    </Image>
-    <Status xmlns="71af3243-3dd4-4a8d-8c0d-dd76da1f02a5">Not started</Status>
-    <Background xmlns="71af3243-3dd4-4a8d-8c0d-dd76da1f02a5">false</Background>
-    <_ip_UnifiedCompliancePolicyProperties xmlns="http://schemas.microsoft.com/sharepoint/v3" xsi:nil="true"/>
-    <ImageTagsTaxHTField xmlns="71af3243-3dd4-4a8d-8c0d-dd76da1f02a5">
-      <Terms xmlns="http://schemas.microsoft.com/office/infopath/2007/PartnerControls"/>
-    </ImageTagsTaxHTField>
-    <TaxCatchAll xmlns="230e9df3-be65-4c73-a93b-d1236ebd677e" xsi:nil="true"/>
-    <MediaServiceKeyPoints xmlns="71af3243-3dd4-4a8d-8c0d-dd76da1f02a5" xsi:nil="true"/>
-  </documentManagement>
-</p:properties>
-</file>
-
 <file path=customXml/itemProps1.xml><?xml version="1.0" encoding="utf-8"?>
 <ds:datastoreItem xmlns:ds="http://schemas.openxmlformats.org/officeDocument/2006/customXml" ds:itemID="{CABF691C-888B-4061-8A6F-D5CE84A0254B}">
   <ds:schemaRefs>
@@ -17143,6 +17143,18 @@
 </file>
 
 <file path=customXml/itemProps2.xml><?xml version="1.0" encoding="utf-8"?>
+<ds:datastoreItem xmlns:ds="http://schemas.openxmlformats.org/officeDocument/2006/customXml" ds:itemID="{49168DCE-134F-4610-A6AA-88CEBE8D71D2}">
+  <ds:schemaRefs>
+    <ds:schemaRef ds:uri="http://schemas.microsoft.com/office/2006/metadata/properties"/>
+    <ds:schemaRef ds:uri="http://schemas.microsoft.com/office/infopath/2007/PartnerControls"/>
+    <ds:schemaRef ds:uri="http://schemas.microsoft.com/sharepoint/v3"/>
+    <ds:schemaRef ds:uri="71af3243-3dd4-4a8d-8c0d-dd76da1f02a5"/>
+    <ds:schemaRef ds:uri="230e9df3-be65-4c73-a93b-d1236ebd677e"/>
+  </ds:schemaRefs>
+</ds:datastoreItem>
+</file>
+
+<file path=customXml/itemProps3.xml><?xml version="1.0" encoding="utf-8"?>
 <ds:datastoreItem xmlns:ds="http://schemas.openxmlformats.org/officeDocument/2006/customXml" ds:itemID="{5EDE3176-A15D-46A3-BDDB-64A0D7363224}">
   <ds:schemaRefs>
     <ds:schemaRef ds:uri="http://schemas.microsoft.com/office/2006/metadata/contentType"/>
@@ -17163,18 +17175,6 @@
 </ds:datastoreItem>
 </file>
 
-<file path=customXml/itemProps3.xml><?xml version="1.0" encoding="utf-8"?>
-<ds:datastoreItem xmlns:ds="http://schemas.openxmlformats.org/officeDocument/2006/customXml" ds:itemID="{49168DCE-134F-4610-A6AA-88CEBE8D71D2}">
-  <ds:schemaRefs>
-    <ds:schemaRef ds:uri="http://schemas.microsoft.com/office/2006/metadata/properties"/>
-    <ds:schemaRef ds:uri="http://schemas.microsoft.com/office/infopath/2007/PartnerControls"/>
-    <ds:schemaRef ds:uri="http://schemas.microsoft.com/sharepoint/v3"/>
-    <ds:schemaRef ds:uri="71af3243-3dd4-4a8d-8c0d-dd76da1f02a5"/>
-    <ds:schemaRef ds:uri="230e9df3-be65-4c73-a93b-d1236ebd677e"/>
-  </ds:schemaRefs>
-</ds:datastoreItem>
-</file>
-
 <file path=docMetadata/LabelInfo.xml><?xml version="1.0" encoding="utf-8"?>
 <clbl:labelList xmlns:clbl="http://schemas.microsoft.com/office/2020/mipLabelMetadata"/>
 </file>
</xml_diff>